<commit_message>
Updated PPT and notes doc
</commit_message>
<xml_diff>
--- a/World Happiness.pptx
+++ b/World Happiness.pptx
@@ -116,6 +116,14 @@
       </a:defRPr>
     </a:lvl9pPr>
   </p:defaultTextStyle>
+  <p:extLst>
+    <p:ext uri="{EFAFB233-063F-42B5-8137-9DF3F51BA10A}">
+      <p15:sldGuideLst xmlns:p15="http://schemas.microsoft.com/office/powerpoint/2012/main"/>
+    </p:ext>
+    <p:ext uri="{2D200454-40CA-4A62-9FC3-DE9A4176ACB9}">
+      <p15:notesGuideLst xmlns:p15="http://schemas.microsoft.com/office/powerpoint/2012/main"/>
+    </p:ext>
+  </p:extLst>
 </p:presentation>
 </file>
 
@@ -201,7 +209,7 @@
           <a:p>
             <a:fld id="{14FECA19-04A7-4E13-9C05-927B7441317C}" type="datetimeFigureOut">
               <a:rPr lang="en-US" smtClean="0"/>
-              <a:t>2/8/2021</a:t>
+              <a:t>2/10/2021</a:t>
             </a:fld>
             <a:endParaRPr lang="en-US"/>
           </a:p>
@@ -790,7 +798,7 @@
           <a:p>
             <a:fld id="{ED291B17-9318-49DB-B28B-6E5994AE9581}" type="datetime1">
               <a:rPr lang="en-US" smtClean="0"/>
-              <a:t>2/8/2021</a:t>
+              <a:t>2/10/2021</a:t>
             </a:fld>
             <a:endParaRPr lang="en-US" dirty="0"/>
           </a:p>
@@ -993,7 +1001,7 @@
           <a:p>
             <a:fld id="{2CED4963-E985-44C4-B8C4-FDD613B7C2F8}" type="datetime1">
               <a:rPr lang="en-US" smtClean="0"/>
-              <a:t>2/8/2021</a:t>
+              <a:t>2/10/2021</a:t>
             </a:fld>
             <a:endParaRPr lang="en-US" dirty="0"/>
           </a:p>
@@ -1355,7 +1363,7 @@
           <a:p>
             <a:fld id="{ED291B17-9318-49DB-B28B-6E5994AE9581}" type="datetime1">
               <a:rPr lang="en-US" smtClean="0"/>
-              <a:t>2/8/2021</a:t>
+              <a:t>2/10/2021</a:t>
             </a:fld>
             <a:endParaRPr lang="en-US" dirty="0"/>
           </a:p>
@@ -1553,7 +1561,7 @@
           <a:p>
             <a:fld id="{78DD82B9-B8EE-4375-B6FF-88FA6ABB15D9}" type="datetime1">
               <a:rPr lang="en-US" smtClean="0"/>
-              <a:t>2/8/2021</a:t>
+              <a:t>2/10/2021</a:t>
             </a:fld>
             <a:endParaRPr lang="en-US" dirty="0"/>
           </a:p>
@@ -1865,7 +1873,7 @@
           <a:p>
             <a:fld id="{B2497495-0637-405E-AE64-5CC7506D51F5}" type="datetime1">
               <a:rPr lang="en-US" smtClean="0"/>
-              <a:t>2/8/2021</a:t>
+              <a:t>2/10/2021</a:t>
             </a:fld>
             <a:endParaRPr lang="en-US" dirty="0"/>
           </a:p>
@@ -2118,7 +2126,7 @@
           <a:p>
             <a:fld id="{7BFFD690-9426-415D-8B65-26881E07B2D4}" type="datetime1">
               <a:rPr lang="en-US" smtClean="0"/>
-              <a:t>2/8/2021</a:t>
+              <a:t>2/10/2021</a:t>
             </a:fld>
             <a:endParaRPr lang="en-US" dirty="0"/>
           </a:p>
@@ -2540,7 +2548,7 @@
           <a:p>
             <a:fld id="{04C4989A-474C-40DE-95B9-011C28B71673}" type="datetime1">
               <a:rPr lang="en-US" smtClean="0"/>
-              <a:t>2/8/2021</a:t>
+              <a:t>2/10/2021</a:t>
             </a:fld>
             <a:endParaRPr lang="en-US" dirty="0"/>
           </a:p>
@@ -2663,7 +2671,7 @@
           <a:p>
             <a:fld id="{5DB4ED54-5B5E-4A04-93D3-5772E3CE3818}" type="datetime1">
               <a:rPr lang="en-US" smtClean="0"/>
-              <a:t>2/8/2021</a:t>
+              <a:t>2/10/2021</a:t>
             </a:fld>
             <a:endParaRPr lang="en-US" dirty="0"/>
           </a:p>
@@ -2758,7 +2766,7 @@
           <a:p>
             <a:fld id="{4EDE50D6-574B-40AF-946F-D52A04ADE379}" type="datetime1">
               <a:rPr lang="en-US" smtClean="0"/>
-              <a:t>2/8/2021</a:t>
+              <a:t>2/10/2021</a:t>
             </a:fld>
             <a:endParaRPr lang="en-US" dirty="0"/>
           </a:p>
@@ -3135,7 +3143,7 @@
           <a:p>
             <a:fld id="{D82884F1-FFEA-405F-9602-3DCA865EDA4E}" type="datetime1">
               <a:rPr lang="en-US" smtClean="0"/>
-              <a:t>2/8/2021</a:t>
+              <a:t>2/10/2021</a:t>
             </a:fld>
             <a:endParaRPr lang="en-US" dirty="0"/>
           </a:p>
@@ -3428,7 +3436,7 @@
           <a:p>
             <a:fld id="{7E18DB4A-8810-4A10-AD5C-D5E2C667F5B3}" type="datetime1">
               <a:rPr lang="en-US" smtClean="0"/>
-              <a:t>2/8/2021</a:t>
+              <a:t>2/10/2021</a:t>
             </a:fld>
             <a:endParaRPr lang="en-US" dirty="0"/>
           </a:p>
@@ -3643,7 +3651,7 @@
           <a:p>
             <a:fld id="{ED291B17-9318-49DB-B28B-6E5994AE9581}" type="datetime1">
               <a:rPr lang="en-US" smtClean="0"/>
-              <a:t>2/8/2021</a:t>
+              <a:t>2/10/2021</a:t>
             </a:fld>
             <a:endParaRPr lang="en-US" dirty="0"/>
           </a:p>
@@ -6942,7 +6950,7 @@
         </p:blipFill>
         <p:spPr>
           <a:xfrm>
-            <a:off x="6096000" y="1132234"/>
+            <a:off x="6096000" y="1220764"/>
             <a:ext cx="5530399" cy="3933745"/>
           </a:xfrm>
           <a:prstGeom prst="rect">
@@ -6986,6 +6994,68 @@
           </a:prstGeom>
         </p:spPr>
       </p:pic>
+      <p:sp>
+        <p:nvSpPr>
+          <p:cNvPr id="8" name="TextBox 7">
+            <a:extLst>
+              <a:ext uri="{FF2B5EF4-FFF2-40B4-BE49-F238E27FC236}">
+                <a16:creationId xmlns:a16="http://schemas.microsoft.com/office/drawing/2014/main" id="{B9A1B1C7-D0BB-47BF-BBBB-260180D69174}"/>
+              </a:ext>
+            </a:extLst>
+          </p:cNvPr>
+          <p:cNvSpPr txBox="1"/>
+          <p:nvPr/>
+        </p:nvSpPr>
+        <p:spPr>
+          <a:xfrm>
+            <a:off x="6794584" y="5045461"/>
+            <a:ext cx="4345996" cy="461665"/>
+          </a:xfrm>
+          <a:prstGeom prst="rect">
+            <a:avLst/>
+          </a:prstGeom>
+          <a:noFill/>
+        </p:spPr>
+        <p:txBody>
+          <a:bodyPr wrap="square">
+            <a:spAutoFit/>
+          </a:bodyPr>
+          <a:lstStyle/>
+          <a:p>
+            <a:r>
+              <a:rPr lang="en-US" sz="1200" b="0" i="0" u="none" strike="noStrike" dirty="0">
+                <a:solidFill>
+                  <a:srgbClr val="000000"/>
+                </a:solidFill>
+                <a:effectLst/>
+                <a:latin typeface="Courier New" panose="02070309020205020404" pitchFamily="49" charset="0"/>
+              </a:rPr>
+              <a:t>The correlation coefficient between GDP Per </a:t>
+            </a:r>
+            <a:r>
+              <a:rPr lang="en-US" sz="1200" b="0" i="0" u="none" strike="noStrike" dirty="0" err="1">
+                <a:solidFill>
+                  <a:srgbClr val="000000"/>
+                </a:solidFill>
+                <a:effectLst/>
+                <a:latin typeface="Courier New" panose="02070309020205020404" pitchFamily="49" charset="0"/>
+              </a:rPr>
+              <a:t>Captia</a:t>
+            </a:r>
+            <a:r>
+              <a:rPr lang="en-US" sz="1200" b="0" i="0" u="none" strike="noStrike" dirty="0">
+                <a:solidFill>
+                  <a:srgbClr val="000000"/>
+                </a:solidFill>
+                <a:effectLst/>
+                <a:latin typeface="Courier New" panose="02070309020205020404" pitchFamily="49" charset="0"/>
+              </a:rPr>
+              <a:t> and Healthy Life Expectancy is 0.78</a:t>
+            </a:r>
+            <a:endParaRPr lang="en-US" sz="1200" dirty="0"/>
+          </a:p>
+        </p:txBody>
+      </p:sp>
     </p:spTree>
     <p:extLst>
       <p:ext uri="{BB962C8B-B14F-4D97-AF65-F5344CB8AC3E}">
@@ -7173,7 +7243,7 @@
         </p:blipFill>
         <p:spPr>
           <a:xfrm>
-            <a:off x="6492579" y="624892"/>
+            <a:off x="6658281" y="624892"/>
             <a:ext cx="4809174" cy="2560320"/>
           </a:xfrm>
           <a:prstGeom prst="rect">
@@ -7264,7 +7334,7 @@
         </p:blipFill>
         <p:spPr>
           <a:xfrm>
-            <a:off x="855330" y="632820"/>
+            <a:off x="824244" y="624892"/>
             <a:ext cx="4844089" cy="2560320"/>
           </a:xfrm>
           <a:prstGeom prst="rect">
@@ -7490,6 +7560,194 @@
           </a:prstGeom>
         </p:spPr>
       </p:pic>
+      <p:sp>
+        <p:nvSpPr>
+          <p:cNvPr id="13" name="TextBox 12">
+            <a:extLst>
+              <a:ext uri="{FF2B5EF4-FFF2-40B4-BE49-F238E27FC236}">
+                <a16:creationId xmlns:a16="http://schemas.microsoft.com/office/drawing/2014/main" id="{6FCACDD4-8719-4E17-8BC2-25440DF4B41B}"/>
+              </a:ext>
+            </a:extLst>
+          </p:cNvPr>
+          <p:cNvSpPr txBox="1"/>
+          <p:nvPr/>
+        </p:nvSpPr>
+        <p:spPr>
+          <a:xfrm>
+            <a:off x="3754139" y="1996580"/>
+            <a:ext cx="1298044" cy="784830"/>
+          </a:xfrm>
+          <a:prstGeom prst="rect">
+            <a:avLst/>
+          </a:prstGeom>
+          <a:noFill/>
+        </p:spPr>
+        <p:txBody>
+          <a:bodyPr wrap="square">
+            <a:spAutoFit/>
+          </a:bodyPr>
+          <a:lstStyle/>
+          <a:p>
+            <a:r>
+              <a:rPr lang="en-US" sz="900" b="0" i="0" u="none" strike="noStrike" dirty="0">
+                <a:solidFill>
+                  <a:srgbClr val="000000"/>
+                </a:solidFill>
+                <a:effectLst/>
+                <a:latin typeface="Courier New" panose="02070309020205020404" pitchFamily="49" charset="0"/>
+              </a:rPr>
+              <a:t>The correlation coefficient between GDP Per </a:t>
+            </a:r>
+            <a:r>
+              <a:rPr lang="en-US" sz="900" b="0" i="0" u="none" strike="noStrike" dirty="0" err="1">
+                <a:solidFill>
+                  <a:srgbClr val="000000"/>
+                </a:solidFill>
+                <a:effectLst/>
+                <a:latin typeface="Courier New" panose="02070309020205020404" pitchFamily="49" charset="0"/>
+              </a:rPr>
+              <a:t>Captia</a:t>
+            </a:r>
+            <a:r>
+              <a:rPr lang="en-US" sz="900" b="0" i="0" u="none" strike="noStrike" dirty="0">
+                <a:solidFill>
+                  <a:srgbClr val="000000"/>
+                </a:solidFill>
+                <a:effectLst/>
+                <a:latin typeface="Courier New" panose="02070309020205020404" pitchFamily="49" charset="0"/>
+              </a:rPr>
+              <a:t> and Score is 0.79</a:t>
+            </a:r>
+            <a:endParaRPr lang="en-US" sz="900" dirty="0"/>
+          </a:p>
+        </p:txBody>
+      </p:sp>
+      <p:sp>
+        <p:nvSpPr>
+          <p:cNvPr id="15" name="TextBox 14">
+            <a:extLst>
+              <a:ext uri="{FF2B5EF4-FFF2-40B4-BE49-F238E27FC236}">
+                <a16:creationId xmlns:a16="http://schemas.microsoft.com/office/drawing/2014/main" id="{93D08CF9-F975-4C5E-8A9F-4AC01DF9CBD6}"/>
+              </a:ext>
+            </a:extLst>
+          </p:cNvPr>
+          <p:cNvSpPr txBox="1"/>
+          <p:nvPr/>
+        </p:nvSpPr>
+        <p:spPr>
+          <a:xfrm>
+            <a:off x="7365534" y="902392"/>
+            <a:ext cx="1237496" cy="784830"/>
+          </a:xfrm>
+          <a:prstGeom prst="rect">
+            <a:avLst/>
+          </a:prstGeom>
+          <a:noFill/>
+        </p:spPr>
+        <p:txBody>
+          <a:bodyPr wrap="square">
+            <a:spAutoFit/>
+          </a:bodyPr>
+          <a:lstStyle/>
+          <a:p>
+            <a:r>
+              <a:rPr lang="en-US" sz="900" b="0" i="0" u="none" strike="noStrike" dirty="0">
+                <a:solidFill>
+                  <a:srgbClr val="000000"/>
+                </a:solidFill>
+                <a:effectLst/>
+                <a:latin typeface="Courier New" panose="02070309020205020404" pitchFamily="49" charset="0"/>
+              </a:rPr>
+              <a:t>The correlation coefficient between Social Support and Score is 0.65</a:t>
+            </a:r>
+            <a:endParaRPr lang="en-US" sz="900" dirty="0"/>
+          </a:p>
+        </p:txBody>
+      </p:sp>
+      <p:sp>
+        <p:nvSpPr>
+          <p:cNvPr id="17" name="TextBox 16">
+            <a:extLst>
+              <a:ext uri="{FF2B5EF4-FFF2-40B4-BE49-F238E27FC236}">
+                <a16:creationId xmlns:a16="http://schemas.microsoft.com/office/drawing/2014/main" id="{DC9D1518-D9F9-4BF4-BB4D-F8CE5C52D611}"/>
+              </a:ext>
+            </a:extLst>
+          </p:cNvPr>
+          <p:cNvSpPr txBox="1"/>
+          <p:nvPr/>
+        </p:nvSpPr>
+        <p:spPr>
+          <a:xfrm>
+            <a:off x="1679895" y="3847147"/>
+            <a:ext cx="1407254" cy="784830"/>
+          </a:xfrm>
+          <a:prstGeom prst="rect">
+            <a:avLst/>
+          </a:prstGeom>
+          <a:noFill/>
+        </p:spPr>
+        <p:txBody>
+          <a:bodyPr wrap="square">
+            <a:spAutoFit/>
+          </a:bodyPr>
+          <a:lstStyle/>
+          <a:p>
+            <a:r>
+              <a:rPr lang="en-US" sz="900" b="0" i="0" u="none" strike="noStrike" dirty="0">
+                <a:solidFill>
+                  <a:srgbClr val="000000"/>
+                </a:solidFill>
+                <a:effectLst/>
+                <a:latin typeface="Courier New" panose="02070309020205020404" pitchFamily="49" charset="0"/>
+              </a:rPr>
+              <a:t>The correlation coefficient between Healthy life expectancy and Score is 0.74</a:t>
+            </a:r>
+            <a:endParaRPr lang="en-US" sz="900" dirty="0"/>
+          </a:p>
+        </p:txBody>
+      </p:sp>
+      <p:sp>
+        <p:nvSpPr>
+          <p:cNvPr id="19" name="TextBox 18">
+            <a:extLst>
+              <a:ext uri="{FF2B5EF4-FFF2-40B4-BE49-F238E27FC236}">
+                <a16:creationId xmlns:a16="http://schemas.microsoft.com/office/drawing/2014/main" id="{ABEFC12A-54A1-4CE3-A1D7-C3E857B1844A}"/>
+              </a:ext>
+            </a:extLst>
+          </p:cNvPr>
+          <p:cNvSpPr txBox="1"/>
+          <p:nvPr/>
+        </p:nvSpPr>
+        <p:spPr>
+          <a:xfrm>
+            <a:off x="7427180" y="3885619"/>
+            <a:ext cx="1339315" cy="707886"/>
+          </a:xfrm>
+          <a:prstGeom prst="rect">
+            <a:avLst/>
+          </a:prstGeom>
+          <a:noFill/>
+        </p:spPr>
+        <p:txBody>
+          <a:bodyPr wrap="square">
+            <a:spAutoFit/>
+          </a:bodyPr>
+          <a:lstStyle/>
+          <a:p>
+            <a:r>
+              <a:rPr lang="en-US" sz="800" b="0" i="0" u="none" strike="noStrike" dirty="0">
+                <a:solidFill>
+                  <a:srgbClr val="000000"/>
+                </a:solidFill>
+                <a:effectLst/>
+                <a:latin typeface="Courier New" panose="02070309020205020404" pitchFamily="49" charset="0"/>
+              </a:rPr>
+              <a:t>The correlation coefficient between Freedom to make life choices and Score is 0.54</a:t>
+            </a:r>
+            <a:endParaRPr lang="en-US" sz="800" dirty="0"/>
+          </a:p>
+        </p:txBody>
+      </p:sp>
     </p:spTree>
     <p:extLst>
       <p:ext uri="{BB962C8B-B14F-4D97-AF65-F5344CB8AC3E}">
@@ -7878,6 +8136,90 @@
           </a:prstGeom>
         </p:spPr>
       </p:pic>
+      <p:sp>
+        <p:nvSpPr>
+          <p:cNvPr id="11" name="TextBox 10">
+            <a:extLst>
+              <a:ext uri="{FF2B5EF4-FFF2-40B4-BE49-F238E27FC236}">
+                <a16:creationId xmlns:a16="http://schemas.microsoft.com/office/drawing/2014/main" id="{D1EF8100-8F57-423E-A7D3-6A262C8BA0F6}"/>
+              </a:ext>
+            </a:extLst>
+          </p:cNvPr>
+          <p:cNvSpPr txBox="1"/>
+          <p:nvPr/>
+        </p:nvSpPr>
+        <p:spPr>
+          <a:xfrm>
+            <a:off x="3827478" y="868071"/>
+            <a:ext cx="1415641" cy="667114"/>
+          </a:xfrm>
+          <a:prstGeom prst="rect">
+            <a:avLst/>
+          </a:prstGeom>
+          <a:noFill/>
+        </p:spPr>
+        <p:txBody>
+          <a:bodyPr wrap="square">
+            <a:spAutoFit/>
+          </a:bodyPr>
+          <a:lstStyle/>
+          <a:p>
+            <a:r>
+              <a:rPr lang="en-US" sz="900" b="0" i="0" u="none" strike="noStrike" dirty="0">
+                <a:solidFill>
+                  <a:srgbClr val="000000"/>
+                </a:solidFill>
+                <a:effectLst/>
+                <a:latin typeface="Courier New" panose="02070309020205020404" pitchFamily="49" charset="0"/>
+              </a:rPr>
+              <a:t>The correlation coefficient between Generosity and Score is 0.14</a:t>
+            </a:r>
+            <a:endParaRPr lang="en-US" sz="900" dirty="0"/>
+          </a:p>
+        </p:txBody>
+      </p:sp>
+      <p:sp>
+        <p:nvSpPr>
+          <p:cNvPr id="13" name="TextBox 12">
+            <a:extLst>
+              <a:ext uri="{FF2B5EF4-FFF2-40B4-BE49-F238E27FC236}">
+                <a16:creationId xmlns:a16="http://schemas.microsoft.com/office/drawing/2014/main" id="{DAB7DE1E-8565-4F84-BDAC-57D2033ED23E}"/>
+              </a:ext>
+            </a:extLst>
+          </p:cNvPr>
+          <p:cNvSpPr txBox="1"/>
+          <p:nvPr/>
+        </p:nvSpPr>
+        <p:spPr>
+          <a:xfrm>
+            <a:off x="9111443" y="1795934"/>
+            <a:ext cx="1257350" cy="922099"/>
+          </a:xfrm>
+          <a:prstGeom prst="rect">
+            <a:avLst/>
+          </a:prstGeom>
+          <a:noFill/>
+        </p:spPr>
+        <p:txBody>
+          <a:bodyPr wrap="square">
+            <a:spAutoFit/>
+          </a:bodyPr>
+          <a:lstStyle/>
+          <a:p>
+            <a:r>
+              <a:rPr lang="en-US" sz="900" b="0" i="0" u="none" strike="noStrike" dirty="0">
+                <a:solidFill>
+                  <a:srgbClr val="000000"/>
+                </a:solidFill>
+                <a:effectLst/>
+                <a:latin typeface="Courier New" panose="02070309020205020404" pitchFamily="49" charset="0"/>
+              </a:rPr>
+              <a:t>The correlation coefficient between Perceptions of corruption and Score is 0.42</a:t>
+            </a:r>
+            <a:endParaRPr lang="en-US" sz="900" dirty="0"/>
+          </a:p>
+        </p:txBody>
+      </p:sp>
     </p:spTree>
     <p:extLst>
       <p:ext uri="{BB962C8B-B14F-4D97-AF65-F5344CB8AC3E}">

</xml_diff>

<commit_message>
Final PPT and presentation notes
</commit_message>
<xml_diff>
--- a/World Happiness.pptx
+++ b/World Happiness.pptx
@@ -20,8 +20,8 @@
     <p:sldId id="271" r:id="rId11"/>
     <p:sldId id="272" r:id="rId12"/>
     <p:sldId id="270" r:id="rId13"/>
-    <p:sldId id="261" r:id="rId14"/>
-    <p:sldId id="262" r:id="rId15"/>
+    <p:sldId id="273" r:id="rId14"/>
+    <p:sldId id="261" r:id="rId15"/>
     <p:sldId id="266" r:id="rId16"/>
   </p:sldIdLst>
   <p:sldSz cx="12192000" cy="6858000"/>
@@ -214,7 +214,7 @@
           <a:p>
             <a:fld id="{14FECA19-04A7-4E13-9C05-927B7441317C}" type="datetimeFigureOut">
               <a:rPr lang="en-US" smtClean="0"/>
-              <a:t>2/11/2021</a:t>
+              <a:t>2/12/2021</a:t>
             </a:fld>
             <a:endParaRPr lang="en-US"/>
           </a:p>
@@ -803,7 +803,7 @@
           <a:p>
             <a:fld id="{ED291B17-9318-49DB-B28B-6E5994AE9581}" type="datetime1">
               <a:rPr lang="en-US" smtClean="0"/>
-              <a:t>2/11/2021</a:t>
+              <a:t>2/12/2021</a:t>
             </a:fld>
             <a:endParaRPr lang="en-US" dirty="0"/>
           </a:p>
@@ -1006,7 +1006,7 @@
           <a:p>
             <a:fld id="{2CED4963-E985-44C4-B8C4-FDD613B7C2F8}" type="datetime1">
               <a:rPr lang="en-US" smtClean="0"/>
-              <a:t>2/11/2021</a:t>
+              <a:t>2/12/2021</a:t>
             </a:fld>
             <a:endParaRPr lang="en-US" dirty="0"/>
           </a:p>
@@ -1368,7 +1368,7 @@
           <a:p>
             <a:fld id="{ED291B17-9318-49DB-B28B-6E5994AE9581}" type="datetime1">
               <a:rPr lang="en-US" smtClean="0"/>
-              <a:t>2/11/2021</a:t>
+              <a:t>2/12/2021</a:t>
             </a:fld>
             <a:endParaRPr lang="en-US" dirty="0"/>
           </a:p>
@@ -1566,7 +1566,7 @@
           <a:p>
             <a:fld id="{78DD82B9-B8EE-4375-B6FF-88FA6ABB15D9}" type="datetime1">
               <a:rPr lang="en-US" smtClean="0"/>
-              <a:t>2/11/2021</a:t>
+              <a:t>2/12/2021</a:t>
             </a:fld>
             <a:endParaRPr lang="en-US" dirty="0"/>
           </a:p>
@@ -1878,7 +1878,7 @@
           <a:p>
             <a:fld id="{B2497495-0637-405E-AE64-5CC7506D51F5}" type="datetime1">
               <a:rPr lang="en-US" smtClean="0"/>
-              <a:t>2/11/2021</a:t>
+              <a:t>2/12/2021</a:t>
             </a:fld>
             <a:endParaRPr lang="en-US" dirty="0"/>
           </a:p>
@@ -2131,7 +2131,7 @@
           <a:p>
             <a:fld id="{7BFFD690-9426-415D-8B65-26881E07B2D4}" type="datetime1">
               <a:rPr lang="en-US" smtClean="0"/>
-              <a:t>2/11/2021</a:t>
+              <a:t>2/12/2021</a:t>
             </a:fld>
             <a:endParaRPr lang="en-US" dirty="0"/>
           </a:p>
@@ -2553,7 +2553,7 @@
           <a:p>
             <a:fld id="{04C4989A-474C-40DE-95B9-011C28B71673}" type="datetime1">
               <a:rPr lang="en-US" smtClean="0"/>
-              <a:t>2/11/2021</a:t>
+              <a:t>2/12/2021</a:t>
             </a:fld>
             <a:endParaRPr lang="en-US" dirty="0"/>
           </a:p>
@@ -2676,7 +2676,7 @@
           <a:p>
             <a:fld id="{5DB4ED54-5B5E-4A04-93D3-5772E3CE3818}" type="datetime1">
               <a:rPr lang="en-US" smtClean="0"/>
-              <a:t>2/11/2021</a:t>
+              <a:t>2/12/2021</a:t>
             </a:fld>
             <a:endParaRPr lang="en-US" dirty="0"/>
           </a:p>
@@ -2771,7 +2771,7 @@
           <a:p>
             <a:fld id="{4EDE50D6-574B-40AF-946F-D52A04ADE379}" type="datetime1">
               <a:rPr lang="en-US" smtClean="0"/>
-              <a:t>2/11/2021</a:t>
+              <a:t>2/12/2021</a:t>
             </a:fld>
             <a:endParaRPr lang="en-US" dirty="0"/>
           </a:p>
@@ -3148,7 +3148,7 @@
           <a:p>
             <a:fld id="{D82884F1-FFEA-405F-9602-3DCA865EDA4E}" type="datetime1">
               <a:rPr lang="en-US" smtClean="0"/>
-              <a:t>2/11/2021</a:t>
+              <a:t>2/12/2021</a:t>
             </a:fld>
             <a:endParaRPr lang="en-US" dirty="0"/>
           </a:p>
@@ -3441,7 +3441,7 @@
           <a:p>
             <a:fld id="{7E18DB4A-8810-4A10-AD5C-D5E2C667F5B3}" type="datetime1">
               <a:rPr lang="en-US" smtClean="0"/>
-              <a:t>2/11/2021</a:t>
+              <a:t>2/12/2021</a:t>
             </a:fld>
             <a:endParaRPr lang="en-US" dirty="0"/>
           </a:p>
@@ -3656,7 +3656,7 @@
           <a:p>
             <a:fld id="{ED291B17-9318-49DB-B28B-6E5994AE9581}" type="datetime1">
               <a:rPr lang="en-US" smtClean="0"/>
-              <a:t>2/11/2021</a:t>
+              <a:t>2/12/2021</a:t>
             </a:fld>
             <a:endParaRPr lang="en-US" dirty="0"/>
           </a:p>
@@ -6780,7 +6780,7 @@
     <p:bg>
       <p:bgPr>
         <a:solidFill>
-          <a:schemeClr val="bg1"/>
+          <a:schemeClr val="bg2"/>
         </a:solidFill>
         <a:effectLst/>
       </p:bgPr>
@@ -6801,10 +6801,10 @@
       </p:grpSpPr>
       <p:sp>
         <p:nvSpPr>
-          <p:cNvPr id="11" name="Rectangle 10">
-            <a:extLst>
-              <a:ext uri="{FF2B5EF4-FFF2-40B4-BE49-F238E27FC236}">
-                <a16:creationId xmlns:a16="http://schemas.microsoft.com/office/drawing/2014/main" id="{E6C8E6EB-4C59-429B-97E4-72A058CFC4FB}"/>
+          <p:cNvPr id="34" name="Rectangle 33">
+            <a:extLst>
+              <a:ext uri="{FF2B5EF4-FFF2-40B4-BE49-F238E27FC236}">
+                <a16:creationId xmlns:a16="http://schemas.microsoft.com/office/drawing/2014/main" id="{DCF4EB5C-ED25-4675-8255-2F5B12CFFCF0}"/>
               </a:ext>
               <a:ext uri="{C183D7F6-B498-43B3-948B-1728B52AA6E4}">
                 <adec:decorative xmlns:adec="http://schemas.microsoft.com/office/drawing/2017/decorative" val="1"/>
@@ -6855,10 +6855,10 @@
       </p:sp>
       <p:sp>
         <p:nvSpPr>
-          <p:cNvPr id="13" name="Rectangle 12">
-            <a:extLst>
-              <a:ext uri="{FF2B5EF4-FFF2-40B4-BE49-F238E27FC236}">
-                <a16:creationId xmlns:a16="http://schemas.microsoft.com/office/drawing/2014/main" id="{B5B90362-AFCC-46A9-B41C-A257A8C5B314}"/>
+          <p:cNvPr id="36" name="Rectangle 35">
+            <a:extLst>
+              <a:ext uri="{FF2B5EF4-FFF2-40B4-BE49-F238E27FC236}">
+                <a16:creationId xmlns:a16="http://schemas.microsoft.com/office/drawing/2014/main" id="{9514EC6E-A557-42A2-BCDC-3ABFFC5E564D}"/>
               </a:ext>
               <a:ext uri="{C183D7F6-B498-43B3-948B-1728B52AA6E4}">
                 <adec:decorative xmlns:adec="http://schemas.microsoft.com/office/drawing/2017/decorative" val="1"/>
@@ -6909,10 +6909,10 @@
       </p:sp>
       <p:sp>
         <p:nvSpPr>
-          <p:cNvPr id="15" name="Rectangle 14">
-            <a:extLst>
-              <a:ext uri="{FF2B5EF4-FFF2-40B4-BE49-F238E27FC236}">
-                <a16:creationId xmlns:a16="http://schemas.microsoft.com/office/drawing/2014/main" id="{F71EF7F1-38BA-471D-8CD4-2A9AE8E35527}"/>
+          <p:cNvPr id="38" name="Rectangle 37">
+            <a:extLst>
+              <a:ext uri="{FF2B5EF4-FFF2-40B4-BE49-F238E27FC236}">
+                <a16:creationId xmlns:a16="http://schemas.microsoft.com/office/drawing/2014/main" id="{905482C9-EB42-4BFE-95BF-7FD661F07657}"/>
               </a:ext>
               <a:ext uri="{C183D7F6-B498-43B3-948B-1728B52AA6E4}">
                 <adec:decorative xmlns:adec="http://schemas.microsoft.com/office/drawing/2017/decorative" val="1"/>
@@ -6963,10 +6963,10 @@
       </p:sp>
       <p:sp>
         <p:nvSpPr>
-          <p:cNvPr id="17" name="Rectangle 16">
-            <a:extLst>
-              <a:ext uri="{FF2B5EF4-FFF2-40B4-BE49-F238E27FC236}">
-                <a16:creationId xmlns:a16="http://schemas.microsoft.com/office/drawing/2014/main" id="{C0524398-BFB4-4C4A-8317-83B8729F9B26}"/>
+          <p:cNvPr id="40" name="Rectangle 39">
+            <a:extLst>
+              <a:ext uri="{FF2B5EF4-FFF2-40B4-BE49-F238E27FC236}">
+                <a16:creationId xmlns:a16="http://schemas.microsoft.com/office/drawing/2014/main" id="{7539E646-A625-4A26-86ED-BD90EDD329F7}"/>
               </a:ext>
               <a:ext uri="{C183D7F6-B498-43B3-948B-1728B52AA6E4}">
                 <adec:decorative xmlns:adec="http://schemas.microsoft.com/office/drawing/2017/decorative" val="1"/>
@@ -7015,12 +7015,12 @@
           </a:fontRef>
         </p:style>
       </p:sp>
-      <p:sp useBgFill="1">
-        <p:nvSpPr>
-          <p:cNvPr id="19" name="Rectangle 18">
-            <a:extLst>
-              <a:ext uri="{FF2B5EF4-FFF2-40B4-BE49-F238E27FC236}">
-                <a16:creationId xmlns:a16="http://schemas.microsoft.com/office/drawing/2014/main" id="{D6D7A0BC-0046-4CAA-8E7F-DCAFE511EA0E}"/>
+      <p:sp>
+        <p:nvSpPr>
+          <p:cNvPr id="42" name="Rectangle 41">
+            <a:extLst>
+              <a:ext uri="{FF2B5EF4-FFF2-40B4-BE49-F238E27FC236}">
+                <a16:creationId xmlns:a16="http://schemas.microsoft.com/office/drawing/2014/main" id="{8E019540-1104-4B12-9F83-45F58674186F}"/>
               </a:ext>
               <a:ext uri="{C183D7F6-B498-43B3-948B-1728B52AA6E4}">
                 <adec:decorative xmlns:adec="http://schemas.microsoft.com/office/drawing/2017/decorative" val="1"/>
@@ -7046,6 +7046,9 @@
           <a:prstGeom prst="rect">
             <a:avLst/>
           </a:prstGeom>
+          <a:solidFill>
+            <a:srgbClr val="3C474C"/>
+          </a:solidFill>
           <a:ln>
             <a:noFill/>
           </a:ln>
@@ -7077,214 +7080,61 @@
       </p:sp>
       <p:sp>
         <p:nvSpPr>
-          <p:cNvPr id="2" name="Title 1">
-            <a:extLst>
-              <a:ext uri="{FF2B5EF4-FFF2-40B4-BE49-F238E27FC236}">
-                <a16:creationId xmlns:a16="http://schemas.microsoft.com/office/drawing/2014/main" id="{26F5B401-CE8D-4EB0-A846-EEB401443669}"/>
-              </a:ext>
-            </a:extLst>
-          </p:cNvPr>
-          <p:cNvSpPr>
-            <a:spLocks noGrp="1"/>
-          </p:cNvSpPr>
-          <p:nvPr>
-            <p:ph type="title"/>
-          </p:nvPr>
-        </p:nvSpPr>
-        <p:spPr>
-          <a:xfrm>
-            <a:off x="596715" y="736885"/>
-            <a:ext cx="3645115" cy="1588513"/>
-          </a:xfrm>
+          <p:cNvPr id="2" name="TextBox 1">
+            <a:extLst>
+              <a:ext uri="{FF2B5EF4-FFF2-40B4-BE49-F238E27FC236}">
+                <a16:creationId xmlns:a16="http://schemas.microsoft.com/office/drawing/2014/main" id="{C29C5EEF-7EA1-49A0-95F3-76D3555A2547}"/>
+              </a:ext>
+            </a:extLst>
+          </p:cNvPr>
+          <p:cNvSpPr txBox="1"/>
+          <p:nvPr/>
+        </p:nvSpPr>
+        <p:spPr>
+          <a:xfrm>
+            <a:off x="320131" y="426935"/>
+            <a:ext cx="11298932" cy="414313"/>
+          </a:xfrm>
+          <a:prstGeom prst="rect">
+            <a:avLst/>
+          </a:prstGeom>
         </p:spPr>
         <p:txBody>
-          <a:bodyPr vert="horz" lIns="91440" tIns="45720" rIns="91440" bIns="45720" rtlCol="0" anchor="b">
-            <a:normAutofit/>
+          <a:bodyPr vert="horz" lIns="91440" tIns="45720" rIns="91440" bIns="45720" rtlCol="0" anchor="ctr">
+            <a:normAutofit fontScale="62500" lnSpcReduction="20000"/>
           </a:bodyPr>
           <a:lstStyle/>
           <a:p>
+            <a:pPr algn="ctr" defTabSz="457200">
+              <a:spcBef>
+                <a:spcPct val="0"/>
+              </a:spcBef>
+              <a:spcAft>
+                <a:spcPts val="600"/>
+              </a:spcAft>
+            </a:pPr>
             <a:r>
-              <a:rPr lang="en-US" sz="3600" dirty="0">
+              <a:rPr lang="en-US" sz="4000" b="0" kern="1200" cap="all" dirty="0">
                 <a:solidFill>
-                  <a:schemeClr val="tx1">
-                    <a:lumMod val="75000"/>
-                    <a:lumOff val="25000"/>
-                  </a:schemeClr>
+                  <a:srgbClr val="FFFFFF">
+                    <a:alpha val="90000"/>
+                  </a:srgbClr>
                 </a:solidFill>
+                <a:latin typeface="+mj-lt"/>
+                <a:ea typeface="+mj-ea"/>
+                <a:cs typeface="+mj-cs"/>
               </a:rPr>
-              <a:t>Correlation map</a:t>
+              <a:t>Happiness Over Time – Top 10</a:t>
             </a:r>
           </a:p>
         </p:txBody>
-      </p:sp>
-      <p:sp>
-        <p:nvSpPr>
-          <p:cNvPr id="21" name="Rectangle 20">
-            <a:extLst>
-              <a:ext uri="{FF2B5EF4-FFF2-40B4-BE49-F238E27FC236}">
-                <a16:creationId xmlns:a16="http://schemas.microsoft.com/office/drawing/2014/main" id="{E7C6334F-6411-41EC-AD7D-179EDD8B58CB}"/>
-              </a:ext>
-              <a:ext uri="{C183D7F6-B498-43B3-948B-1728B52AA6E4}">
-                <adec:decorative xmlns:adec="http://schemas.microsoft.com/office/drawing/2017/decorative" val="1"/>
-              </a:ext>
-            </a:extLst>
-          </p:cNvPr>
-          <p:cNvSpPr>
-            <a:spLocks noGrp="1" noRot="1" noChangeAspect="1" noMove="1" noResize="1" noEditPoints="1" noAdjustHandles="1" noChangeArrowheads="1" noChangeShapeType="1" noTextEdit="1"/>
-          </p:cNvSpPr>
-          <p:nvPr>
-            <p:extLst>
-              <p:ext uri="{386F3935-93C4-4BCD-93E2-E3B085C9AB24}">
-                <p16:designElem xmlns:p16="http://schemas.microsoft.com/office/powerpoint/2015/main" val="1"/>
-              </p:ext>
-            </p:extLst>
-          </p:nvPr>
-        </p:nvSpPr>
-        <p:spPr>
-          <a:xfrm>
-            <a:off x="446534" y="457200"/>
-            <a:ext cx="3703320" cy="94997"/>
-          </a:xfrm>
-          <a:prstGeom prst="rect">
-            <a:avLst/>
-          </a:prstGeom>
-          <a:solidFill>
-            <a:srgbClr val="465359"/>
-          </a:solidFill>
-          <a:ln>
-            <a:noFill/>
-          </a:ln>
-          <a:effectLst/>
-        </p:spPr>
-        <p:style>
-          <a:lnRef idx="1">
-            <a:schemeClr val="accent1"/>
-          </a:lnRef>
-          <a:fillRef idx="3">
-            <a:schemeClr val="accent1"/>
-          </a:fillRef>
-          <a:effectRef idx="2">
-            <a:schemeClr val="accent1"/>
-          </a:effectRef>
-          <a:fontRef idx="minor">
-            <a:schemeClr val="lt1"/>
-          </a:fontRef>
-        </p:style>
-      </p:sp>
-      <p:sp>
-        <p:nvSpPr>
-          <p:cNvPr id="23" name="Rectangle 22">
-            <a:extLst>
-              <a:ext uri="{FF2B5EF4-FFF2-40B4-BE49-F238E27FC236}">
-                <a16:creationId xmlns:a16="http://schemas.microsoft.com/office/drawing/2014/main" id="{E6B02CEE-3AF8-4349-9B3E-8970E6DF62B3}"/>
-              </a:ext>
-              <a:ext uri="{C183D7F6-B498-43B3-948B-1728B52AA6E4}">
-                <adec:decorative xmlns:adec="http://schemas.microsoft.com/office/drawing/2017/decorative" val="1"/>
-              </a:ext>
-            </a:extLst>
-          </p:cNvPr>
-          <p:cNvSpPr>
-            <a:spLocks noGrp="1" noRot="1" noChangeAspect="1" noMove="1" noResize="1" noEditPoints="1" noAdjustHandles="1" noChangeArrowheads="1" noChangeShapeType="1" noTextEdit="1"/>
-          </p:cNvSpPr>
-          <p:nvPr>
-            <p:extLst>
-              <p:ext uri="{386F3935-93C4-4BCD-93E2-E3B085C9AB24}">
-                <p16:designElem xmlns:p16="http://schemas.microsoft.com/office/powerpoint/2015/main" val="1"/>
-              </p:ext>
-            </p:extLst>
-          </p:nvPr>
-        </p:nvSpPr>
-        <p:spPr>
-          <a:xfrm>
-            <a:off x="4241830" y="457200"/>
-            <a:ext cx="3703320" cy="91440"/>
-          </a:xfrm>
-          <a:prstGeom prst="rect">
-            <a:avLst/>
-          </a:prstGeom>
-          <a:solidFill>
-            <a:schemeClr val="accent1"/>
-          </a:solidFill>
-          <a:ln>
-            <a:noFill/>
-          </a:ln>
-          <a:effectLst/>
-        </p:spPr>
-        <p:style>
-          <a:lnRef idx="1">
-            <a:schemeClr val="accent1"/>
-          </a:lnRef>
-          <a:fillRef idx="3">
-            <a:schemeClr val="accent1"/>
-          </a:fillRef>
-          <a:effectRef idx="2">
-            <a:schemeClr val="accent1"/>
-          </a:effectRef>
-          <a:fontRef idx="minor">
-            <a:schemeClr val="lt1"/>
-          </a:fontRef>
-        </p:style>
-      </p:sp>
-      <p:sp>
-        <p:nvSpPr>
-          <p:cNvPr id="25" name="Rectangle 24">
-            <a:extLst>
-              <a:ext uri="{FF2B5EF4-FFF2-40B4-BE49-F238E27FC236}">
-                <a16:creationId xmlns:a16="http://schemas.microsoft.com/office/drawing/2014/main" id="{AAA01CF0-3FB5-44EB-B7DE-F2E86374C2FB}"/>
-              </a:ext>
-              <a:ext uri="{C183D7F6-B498-43B3-948B-1728B52AA6E4}">
-                <adec:decorative xmlns:adec="http://schemas.microsoft.com/office/drawing/2017/decorative" val="1"/>
-              </a:ext>
-            </a:extLst>
-          </p:cNvPr>
-          <p:cNvSpPr>
-            <a:spLocks noGrp="1" noRot="1" noChangeAspect="1" noMove="1" noResize="1" noEditPoints="1" noAdjustHandles="1" noChangeArrowheads="1" noChangeShapeType="1" noTextEdit="1"/>
-          </p:cNvSpPr>
-          <p:nvPr>
-            <p:extLst>
-              <p:ext uri="{386F3935-93C4-4BCD-93E2-E3B085C9AB24}">
-                <p16:designElem xmlns:p16="http://schemas.microsoft.com/office/powerpoint/2015/main" val="1"/>
-              </p:ext>
-            </p:extLst>
-          </p:nvPr>
-        </p:nvSpPr>
-        <p:spPr>
-          <a:xfrm>
-            <a:off x="8042147" y="453643"/>
-            <a:ext cx="3703320" cy="98554"/>
-          </a:xfrm>
-          <a:prstGeom prst="rect">
-            <a:avLst/>
-          </a:prstGeom>
-          <a:solidFill>
-            <a:srgbClr val="969FA7"/>
-          </a:solidFill>
-          <a:ln>
-            <a:noFill/>
-          </a:ln>
-          <a:effectLst/>
-        </p:spPr>
-        <p:style>
-          <a:lnRef idx="1">
-            <a:schemeClr val="accent1"/>
-          </a:lnRef>
-          <a:fillRef idx="3">
-            <a:schemeClr val="accent1"/>
-          </a:fillRef>
-          <a:effectRef idx="2">
-            <a:schemeClr val="accent1"/>
-          </a:effectRef>
-          <a:fontRef idx="minor">
-            <a:schemeClr val="lt1"/>
-          </a:fontRef>
-        </p:style>
       </p:sp>
       <p:pic>
         <p:nvPicPr>
-          <p:cNvPr id="8" name="Picture 7">
-            <a:extLst>
-              <a:ext uri="{FF2B5EF4-FFF2-40B4-BE49-F238E27FC236}">
-                <a16:creationId xmlns:a16="http://schemas.microsoft.com/office/drawing/2014/main" id="{45B31718-E9CF-4C0D-826F-3D40E8F1AE06}"/>
+          <p:cNvPr id="7" name="Picture 6">
+            <a:extLst>
+              <a:ext uri="{FF2B5EF4-FFF2-40B4-BE49-F238E27FC236}">
+                <a16:creationId xmlns:a16="http://schemas.microsoft.com/office/drawing/2014/main" id="{F9C74DA6-123E-4F9D-B27E-F11B986CCA74}"/>
               </a:ext>
             </a:extLst>
           </p:cNvPr>
@@ -7301,8 +7151,8 @@
         </p:blipFill>
         <p:spPr>
           <a:xfrm>
-            <a:off x="3523545" y="1017800"/>
-            <a:ext cx="7850088" cy="5794441"/>
+            <a:off x="2294947" y="867956"/>
+            <a:ext cx="7391366" cy="5727916"/>
           </a:xfrm>
           <a:prstGeom prst="rect">
             <a:avLst/>
@@ -7312,12 +7162,12 @@
     </p:spTree>
     <p:extLst>
       <p:ext uri="{BB962C8B-B14F-4D97-AF65-F5344CB8AC3E}">
-        <p14:creationId xmlns:p14="http://schemas.microsoft.com/office/powerpoint/2010/main" val="4189587326"/>
+        <p14:creationId xmlns:p14="http://schemas.microsoft.com/office/powerpoint/2010/main" val="4096695778"/>
       </p:ext>
     </p:extLst>
   </p:cSld>
   <p:clrMapOvr>
-    <a:masterClrMapping/>
+    <a:overrideClrMapping bg1="dk1" tx1="lt1" bg2="dk2" tx2="lt2" accent1="accent1" accent2="accent2" accent3="accent3" accent4="accent4" accent5="accent5" accent6="accent6" hlink="hlink" folHlink="folHlink"/>
   </p:clrMapOvr>
 </p:sld>
 </file>
@@ -7349,10 +7199,10 @@
       </p:grpSpPr>
       <p:sp>
         <p:nvSpPr>
-          <p:cNvPr id="9" name="Rectangle 8">
-            <a:extLst>
-              <a:ext uri="{FF2B5EF4-FFF2-40B4-BE49-F238E27FC236}">
-                <a16:creationId xmlns:a16="http://schemas.microsoft.com/office/drawing/2014/main" id="{DD651B61-325E-4E73-8445-38B0DE8AAAB6}"/>
+          <p:cNvPr id="11" name="Rectangle 10">
+            <a:extLst>
+              <a:ext uri="{FF2B5EF4-FFF2-40B4-BE49-F238E27FC236}">
+                <a16:creationId xmlns:a16="http://schemas.microsoft.com/office/drawing/2014/main" id="{E6C8E6EB-4C59-429B-97E4-72A058CFC4FB}"/>
               </a:ext>
               <a:ext uri="{C183D7F6-B498-43B3-948B-1728B52AA6E4}">
                 <adec:decorative xmlns:adec="http://schemas.microsoft.com/office/drawing/2017/decorative" val="1"/>
@@ -7403,10 +7253,10 @@
       </p:sp>
       <p:sp>
         <p:nvSpPr>
-          <p:cNvPr id="11" name="Rectangle 10">
-            <a:extLst>
-              <a:ext uri="{FF2B5EF4-FFF2-40B4-BE49-F238E27FC236}">
-                <a16:creationId xmlns:a16="http://schemas.microsoft.com/office/drawing/2014/main" id="{B42E5253-D3AC-4AC2-B766-8B34F13C2F5E}"/>
+          <p:cNvPr id="13" name="Rectangle 12">
+            <a:extLst>
+              <a:ext uri="{FF2B5EF4-FFF2-40B4-BE49-F238E27FC236}">
+                <a16:creationId xmlns:a16="http://schemas.microsoft.com/office/drawing/2014/main" id="{B5B90362-AFCC-46A9-B41C-A257A8C5B314}"/>
               </a:ext>
               <a:ext uri="{C183D7F6-B498-43B3-948B-1728B52AA6E4}">
                 <adec:decorative xmlns:adec="http://schemas.microsoft.com/office/drawing/2017/decorative" val="1"/>
@@ -7457,10 +7307,10 @@
       </p:sp>
       <p:sp>
         <p:nvSpPr>
-          <p:cNvPr id="13" name="Rectangle 12">
-            <a:extLst>
-              <a:ext uri="{FF2B5EF4-FFF2-40B4-BE49-F238E27FC236}">
-                <a16:creationId xmlns:a16="http://schemas.microsoft.com/office/drawing/2014/main" id="{10AE8D57-436A-4073-9A75-15BB5949F8B4}"/>
+          <p:cNvPr id="15" name="Rectangle 14">
+            <a:extLst>
+              <a:ext uri="{FF2B5EF4-FFF2-40B4-BE49-F238E27FC236}">
+                <a16:creationId xmlns:a16="http://schemas.microsoft.com/office/drawing/2014/main" id="{F71EF7F1-38BA-471D-8CD4-2A9AE8E35527}"/>
               </a:ext>
               <a:ext uri="{C183D7F6-B498-43B3-948B-1728B52AA6E4}">
                 <adec:decorative xmlns:adec="http://schemas.microsoft.com/office/drawing/2017/decorative" val="1"/>
@@ -7511,10 +7361,10 @@
       </p:sp>
       <p:sp>
         <p:nvSpPr>
-          <p:cNvPr id="15" name="Rectangle 14">
-            <a:extLst>
-              <a:ext uri="{FF2B5EF4-FFF2-40B4-BE49-F238E27FC236}">
-                <a16:creationId xmlns:a16="http://schemas.microsoft.com/office/drawing/2014/main" id="{E2852671-8EB6-4EAF-8AF8-65CF3FD66456}"/>
+          <p:cNvPr id="17" name="Rectangle 16">
+            <a:extLst>
+              <a:ext uri="{FF2B5EF4-FFF2-40B4-BE49-F238E27FC236}">
+                <a16:creationId xmlns:a16="http://schemas.microsoft.com/office/drawing/2014/main" id="{C0524398-BFB4-4C4A-8317-83B8729F9B26}"/>
               </a:ext>
               <a:ext uri="{C183D7F6-B498-43B3-948B-1728B52AA6E4}">
                 <adec:decorative xmlns:adec="http://schemas.microsoft.com/office/drawing/2017/decorative" val="1"/>
@@ -7565,10 +7415,10 @@
       </p:sp>
       <p:sp useBgFill="1">
         <p:nvSpPr>
-          <p:cNvPr id="17" name="Rectangle 16">
-            <a:extLst>
-              <a:ext uri="{FF2B5EF4-FFF2-40B4-BE49-F238E27FC236}">
-                <a16:creationId xmlns:a16="http://schemas.microsoft.com/office/drawing/2014/main" id="{963FC0CD-F19B-4D9C-9C47-EB7E9D16E444}"/>
+          <p:cNvPr id="19" name="Rectangle 18">
+            <a:extLst>
+              <a:ext uri="{FF2B5EF4-FFF2-40B4-BE49-F238E27FC236}">
+                <a16:creationId xmlns:a16="http://schemas.microsoft.com/office/drawing/2014/main" id="{D6D7A0BC-0046-4CAA-8E7F-DCAFE511EA0E}"/>
               </a:ext>
               <a:ext uri="{C183D7F6-B498-43B3-948B-1728B52AA6E4}">
                 <adec:decorative xmlns:adec="http://schemas.microsoft.com/office/drawing/2017/decorative" val="1"/>
@@ -7628,7 +7478,7 @@
           <p:cNvPr id="2" name="Title 1">
             <a:extLst>
               <a:ext uri="{FF2B5EF4-FFF2-40B4-BE49-F238E27FC236}">
-                <a16:creationId xmlns:a16="http://schemas.microsoft.com/office/drawing/2014/main" id="{817454E1-9483-4FD7-8B28-52A799E91058}"/>
+                <a16:creationId xmlns:a16="http://schemas.microsoft.com/office/drawing/2014/main" id="{26F5B401-CE8D-4EB0-A846-EEB401443669}"/>
               </a:ext>
             </a:extLst>
           </p:cNvPr>
@@ -7641,8 +7491,8 @@
         </p:nvSpPr>
         <p:spPr>
           <a:xfrm>
-            <a:off x="581191" y="723901"/>
-            <a:ext cx="10993549" cy="741644"/>
+            <a:off x="596715" y="736885"/>
+            <a:ext cx="3645115" cy="1588513"/>
           </a:xfrm>
         </p:spPr>
         <p:txBody>
@@ -7660,17 +7510,17 @@
                   </a:schemeClr>
                 </a:solidFill>
               </a:rPr>
-              <a:t>World Heat map</a:t>
+              <a:t>Correlation map</a:t>
             </a:r>
           </a:p>
         </p:txBody>
       </p:sp>
       <p:sp>
         <p:nvSpPr>
-          <p:cNvPr id="19" name="Rectangle 18">
-            <a:extLst>
-              <a:ext uri="{FF2B5EF4-FFF2-40B4-BE49-F238E27FC236}">
-                <a16:creationId xmlns:a16="http://schemas.microsoft.com/office/drawing/2014/main" id="{2E70159E-5269-4C18-AA0B-D50513DB3B3C}"/>
+          <p:cNvPr id="21" name="Rectangle 20">
+            <a:extLst>
+              <a:ext uri="{FF2B5EF4-FFF2-40B4-BE49-F238E27FC236}">
+                <a16:creationId xmlns:a16="http://schemas.microsoft.com/office/drawing/2014/main" id="{E7C6334F-6411-41EC-AD7D-179EDD8B58CB}"/>
               </a:ext>
               <a:ext uri="{C183D7F6-B498-43B3-948B-1728B52AA6E4}">
                 <adec:decorative xmlns:adec="http://schemas.microsoft.com/office/drawing/2017/decorative" val="1"/>
@@ -7721,10 +7571,10 @@
       </p:sp>
       <p:sp>
         <p:nvSpPr>
-          <p:cNvPr id="21" name="Rectangle 20">
-            <a:extLst>
-              <a:ext uri="{FF2B5EF4-FFF2-40B4-BE49-F238E27FC236}">
-                <a16:creationId xmlns:a16="http://schemas.microsoft.com/office/drawing/2014/main" id="{BBBE9C8C-98B2-41C2-B47B-9A396CBA2326}"/>
+          <p:cNvPr id="23" name="Rectangle 22">
+            <a:extLst>
+              <a:ext uri="{FF2B5EF4-FFF2-40B4-BE49-F238E27FC236}">
+                <a16:creationId xmlns:a16="http://schemas.microsoft.com/office/drawing/2014/main" id="{E6B02CEE-3AF8-4349-9B3E-8970E6DF62B3}"/>
               </a:ext>
               <a:ext uri="{C183D7F6-B498-43B3-948B-1728B52AA6E4}">
                 <adec:decorative xmlns:adec="http://schemas.microsoft.com/office/drawing/2017/decorative" val="1"/>
@@ -7775,10 +7625,10 @@
       </p:sp>
       <p:sp>
         <p:nvSpPr>
-          <p:cNvPr id="23" name="Rectangle 22">
-            <a:extLst>
-              <a:ext uri="{FF2B5EF4-FFF2-40B4-BE49-F238E27FC236}">
-                <a16:creationId xmlns:a16="http://schemas.microsoft.com/office/drawing/2014/main" id="{B2ECCA3D-5ECA-4A8B-B9D7-CE6DEB72B952}"/>
+          <p:cNvPr id="25" name="Rectangle 24">
+            <a:extLst>
+              <a:ext uri="{FF2B5EF4-FFF2-40B4-BE49-F238E27FC236}">
+                <a16:creationId xmlns:a16="http://schemas.microsoft.com/office/drawing/2014/main" id="{AAA01CF0-3FB5-44EB-B7DE-F2E86374C2FB}"/>
               </a:ext>
               <a:ext uri="{C183D7F6-B498-43B3-948B-1728B52AA6E4}">
                 <adec:decorative xmlns:adec="http://schemas.microsoft.com/office/drawing/2017/decorative" val="1"/>
@@ -7827,10 +7677,40 @@
           </a:fontRef>
         </p:style>
       </p:sp>
+      <p:pic>
+        <p:nvPicPr>
+          <p:cNvPr id="8" name="Picture 7">
+            <a:extLst>
+              <a:ext uri="{FF2B5EF4-FFF2-40B4-BE49-F238E27FC236}">
+                <a16:creationId xmlns:a16="http://schemas.microsoft.com/office/drawing/2014/main" id="{45B31718-E9CF-4C0D-826F-3D40E8F1AE06}"/>
+              </a:ext>
+            </a:extLst>
+          </p:cNvPr>
+          <p:cNvPicPr>
+            <a:picLocks noChangeAspect="1"/>
+          </p:cNvPicPr>
+          <p:nvPr/>
+        </p:nvPicPr>
+        <p:blipFill>
+          <a:blip r:embed="rId2"/>
+          <a:stretch>
+            <a:fillRect/>
+          </a:stretch>
+        </p:blipFill>
+        <p:spPr>
+          <a:xfrm>
+            <a:off x="3523545" y="1017800"/>
+            <a:ext cx="7850088" cy="5794441"/>
+          </a:xfrm>
+          <a:prstGeom prst="rect">
+            <a:avLst/>
+          </a:prstGeom>
+        </p:spPr>
+      </p:pic>
     </p:spTree>
     <p:extLst>
       <p:ext uri="{BB962C8B-B14F-4D97-AF65-F5344CB8AC3E}">
-        <p14:creationId xmlns:p14="http://schemas.microsoft.com/office/powerpoint/2010/main" val="881537250"/>
+        <p14:creationId xmlns:p14="http://schemas.microsoft.com/office/powerpoint/2010/main" val="4189587326"/>
       </p:ext>
     </p:extLst>
   </p:cSld>
@@ -10578,6 +10458,73 @@
           </a:prstGeom>
         </p:spPr>
       </p:pic>
+      <p:sp>
+        <p:nvSpPr>
+          <p:cNvPr id="15" name="TextBox 14">
+            <a:extLst>
+              <a:ext uri="{FF2B5EF4-FFF2-40B4-BE49-F238E27FC236}">
+                <a16:creationId xmlns:a16="http://schemas.microsoft.com/office/drawing/2014/main" id="{D16AC9CB-6C1A-49B4-A28F-F8501B74701A}"/>
+              </a:ext>
+            </a:extLst>
+          </p:cNvPr>
+          <p:cNvSpPr txBox="1"/>
+          <p:nvPr/>
+        </p:nvSpPr>
+        <p:spPr>
+          <a:xfrm>
+            <a:off x="4906792" y="3962294"/>
+            <a:ext cx="1649456" cy="861774"/>
+          </a:xfrm>
+          <a:prstGeom prst="rect">
+            <a:avLst/>
+          </a:prstGeom>
+          <a:solidFill>
+            <a:schemeClr val="accent1">
+              <a:lumMod val="20000"/>
+              <a:lumOff val="80000"/>
+            </a:schemeClr>
+          </a:solidFill>
+        </p:spPr>
+        <p:txBody>
+          <a:bodyPr wrap="square">
+            <a:spAutoFit/>
+          </a:bodyPr>
+          <a:lstStyle/>
+          <a:p>
+            <a:r>
+              <a:rPr lang="en-US" sz="1000" b="0" i="0" u="none" strike="noStrike" dirty="0">
+                <a:solidFill>
+                  <a:srgbClr val="000000"/>
+                </a:solidFill>
+                <a:effectLst/>
+                <a:latin typeface="Courier New" panose="02070309020205020404" pitchFamily="49" charset="0"/>
+              </a:rPr>
+              <a:t>The correlation coefficient between GDP Per </a:t>
+            </a:r>
+            <a:r>
+              <a:rPr lang="en-US" sz="1000" b="0" i="0" u="none" strike="noStrike" dirty="0" err="1">
+                <a:solidFill>
+                  <a:srgbClr val="000000"/>
+                </a:solidFill>
+                <a:effectLst/>
+                <a:latin typeface="Courier New" panose="02070309020205020404" pitchFamily="49" charset="0"/>
+              </a:rPr>
+              <a:t>Captia</a:t>
+            </a:r>
+            <a:r>
+              <a:rPr lang="en-US" sz="1000" b="0" i="0" u="none" strike="noStrike" dirty="0">
+                <a:solidFill>
+                  <a:srgbClr val="000000"/>
+                </a:solidFill>
+                <a:effectLst/>
+                <a:latin typeface="Courier New" panose="02070309020205020404" pitchFamily="49" charset="0"/>
+              </a:rPr>
+              <a:t> and Healthy Life Expectancy is 0.78</a:t>
+            </a:r>
+            <a:endParaRPr lang="en-US" sz="1000" dirty="0"/>
+          </a:p>
+        </p:txBody>
+      </p:sp>
     </p:spTree>
     <p:extLst>
       <p:ext uri="{BB962C8B-B14F-4D97-AF65-F5344CB8AC3E}">
@@ -11142,6 +11089,198 @@
           </a:prstGeom>
         </p:spPr>
       </p:pic>
+      <p:sp>
+        <p:nvSpPr>
+          <p:cNvPr id="14" name="TextBox 13">
+            <a:extLst>
+              <a:ext uri="{FF2B5EF4-FFF2-40B4-BE49-F238E27FC236}">
+                <a16:creationId xmlns:a16="http://schemas.microsoft.com/office/drawing/2014/main" id="{44B66B27-9E9B-48D6-B129-E165E69C1EA5}"/>
+              </a:ext>
+            </a:extLst>
+          </p:cNvPr>
+          <p:cNvSpPr txBox="1"/>
+          <p:nvPr/>
+        </p:nvSpPr>
+        <p:spPr>
+          <a:xfrm>
+            <a:off x="720600" y="2828502"/>
+            <a:ext cx="3006892" cy="400110"/>
+          </a:xfrm>
+          <a:prstGeom prst="rect">
+            <a:avLst/>
+          </a:prstGeom>
+          <a:noFill/>
+        </p:spPr>
+        <p:txBody>
+          <a:bodyPr wrap="square">
+            <a:spAutoFit/>
+          </a:bodyPr>
+          <a:lstStyle/>
+          <a:p>
+            <a:pPr algn="ctr"/>
+            <a:r>
+              <a:rPr lang="en-US" sz="1000" b="0" i="0" u="none" strike="noStrike" dirty="0">
+                <a:solidFill>
+                  <a:srgbClr val="000000"/>
+                </a:solidFill>
+                <a:effectLst/>
+                <a:latin typeface="Courier New" panose="02070309020205020404" pitchFamily="49" charset="0"/>
+              </a:rPr>
+              <a:t>The correlation coefficient between GDP Per </a:t>
+            </a:r>
+            <a:r>
+              <a:rPr lang="en-US" sz="1000" b="0" i="0" u="none" strike="noStrike" dirty="0" err="1">
+                <a:solidFill>
+                  <a:srgbClr val="000000"/>
+                </a:solidFill>
+                <a:effectLst/>
+                <a:latin typeface="Courier New" panose="02070309020205020404" pitchFamily="49" charset="0"/>
+              </a:rPr>
+              <a:t>Captia</a:t>
+            </a:r>
+            <a:r>
+              <a:rPr lang="en-US" sz="1000" b="0" i="0" u="none" strike="noStrike" dirty="0">
+                <a:solidFill>
+                  <a:srgbClr val="000000"/>
+                </a:solidFill>
+                <a:effectLst/>
+                <a:latin typeface="Courier New" panose="02070309020205020404" pitchFamily="49" charset="0"/>
+              </a:rPr>
+              <a:t> and Score is 0.79</a:t>
+            </a:r>
+            <a:endParaRPr lang="en-US" sz="1000" dirty="0"/>
+          </a:p>
+        </p:txBody>
+      </p:sp>
+      <p:sp>
+        <p:nvSpPr>
+          <p:cNvPr id="17" name="TextBox 16">
+            <a:extLst>
+              <a:ext uri="{FF2B5EF4-FFF2-40B4-BE49-F238E27FC236}">
+                <a16:creationId xmlns:a16="http://schemas.microsoft.com/office/drawing/2014/main" id="{14813C71-7B23-48C5-AF48-BDB649E3C61A}"/>
+              </a:ext>
+            </a:extLst>
+          </p:cNvPr>
+          <p:cNvSpPr txBox="1"/>
+          <p:nvPr/>
+        </p:nvSpPr>
+        <p:spPr>
+          <a:xfrm>
+            <a:off x="622549" y="5952652"/>
+            <a:ext cx="3170682" cy="400110"/>
+          </a:xfrm>
+          <a:prstGeom prst="rect">
+            <a:avLst/>
+          </a:prstGeom>
+          <a:noFill/>
+        </p:spPr>
+        <p:txBody>
+          <a:bodyPr wrap="square">
+            <a:spAutoFit/>
+          </a:bodyPr>
+          <a:lstStyle/>
+          <a:p>
+            <a:pPr algn="ctr"/>
+            <a:r>
+              <a:rPr lang="en-US" sz="1000" b="0" i="0" u="none" strike="noStrike" dirty="0">
+                <a:solidFill>
+                  <a:srgbClr val="000000"/>
+                </a:solidFill>
+                <a:effectLst/>
+                <a:latin typeface="Courier New" panose="02070309020205020404" pitchFamily="49" charset="0"/>
+              </a:rPr>
+              <a:t>The correlation coefficient between Social Support and Score is 0.65</a:t>
+            </a:r>
+            <a:endParaRPr lang="en-US" sz="1000" dirty="0"/>
+          </a:p>
+        </p:txBody>
+      </p:sp>
+      <p:sp>
+        <p:nvSpPr>
+          <p:cNvPr id="19" name="TextBox 18">
+            <a:extLst>
+              <a:ext uri="{FF2B5EF4-FFF2-40B4-BE49-F238E27FC236}">
+                <a16:creationId xmlns:a16="http://schemas.microsoft.com/office/drawing/2014/main" id="{6FAC5F11-BAAF-4DF9-A9EF-8C674AF5F616}"/>
+              </a:ext>
+            </a:extLst>
+          </p:cNvPr>
+          <p:cNvSpPr txBox="1"/>
+          <p:nvPr/>
+        </p:nvSpPr>
+        <p:spPr>
+          <a:xfrm>
+            <a:off x="8229007" y="2818109"/>
+            <a:ext cx="3421924" cy="400110"/>
+          </a:xfrm>
+          <a:prstGeom prst="rect">
+            <a:avLst/>
+          </a:prstGeom>
+          <a:noFill/>
+        </p:spPr>
+        <p:txBody>
+          <a:bodyPr wrap="square">
+            <a:spAutoFit/>
+          </a:bodyPr>
+          <a:lstStyle/>
+          <a:p>
+            <a:pPr algn="ctr"/>
+            <a:r>
+              <a:rPr lang="en-US" sz="1000" b="0" i="0" u="none" strike="noStrike" dirty="0">
+                <a:solidFill>
+                  <a:srgbClr val="000000"/>
+                </a:solidFill>
+                <a:effectLst/>
+                <a:latin typeface="Courier New" panose="02070309020205020404" pitchFamily="49" charset="0"/>
+              </a:rPr>
+              <a:t>The correlation coefficient between Healthy life expectancy and Score is 0.74</a:t>
+            </a:r>
+            <a:endParaRPr lang="en-US" sz="1000" dirty="0"/>
+          </a:p>
+        </p:txBody>
+      </p:sp>
+      <p:sp>
+        <p:nvSpPr>
+          <p:cNvPr id="21" name="TextBox 20">
+            <a:extLst>
+              <a:ext uri="{FF2B5EF4-FFF2-40B4-BE49-F238E27FC236}">
+                <a16:creationId xmlns:a16="http://schemas.microsoft.com/office/drawing/2014/main" id="{028C5B06-A783-4A65-A379-9F98BD377C4A}"/>
+              </a:ext>
+            </a:extLst>
+          </p:cNvPr>
+          <p:cNvSpPr txBox="1"/>
+          <p:nvPr/>
+        </p:nvSpPr>
+        <p:spPr>
+          <a:xfrm>
+            <a:off x="8189792" y="5880250"/>
+            <a:ext cx="3540877" cy="400110"/>
+          </a:xfrm>
+          <a:prstGeom prst="rect">
+            <a:avLst/>
+          </a:prstGeom>
+          <a:noFill/>
+        </p:spPr>
+        <p:txBody>
+          <a:bodyPr wrap="square">
+            <a:spAutoFit/>
+          </a:bodyPr>
+          <a:lstStyle/>
+          <a:p>
+            <a:pPr algn="ctr"/>
+            <a:r>
+              <a:rPr lang="en-US" sz="1000" b="0" i="0" u="none" strike="noStrike" dirty="0">
+                <a:solidFill>
+                  <a:srgbClr val="000000"/>
+                </a:solidFill>
+                <a:effectLst/>
+                <a:latin typeface="Courier New" panose="02070309020205020404" pitchFamily="49" charset="0"/>
+              </a:rPr>
+              <a:t>The correlation coefficient between Freedom to make life choices and Score is 0.54</a:t>
+            </a:r>
+            <a:endParaRPr lang="en-US" sz="1000" dirty="0"/>
+          </a:p>
+        </p:txBody>
+      </p:sp>
     </p:spTree>
     <p:extLst>
       <p:ext uri="{BB962C8B-B14F-4D97-AF65-F5344CB8AC3E}">
@@ -11654,6 +11793,92 @@
           </a:prstGeom>
         </p:spPr>
       </p:pic>
+      <p:sp>
+        <p:nvSpPr>
+          <p:cNvPr id="12" name="TextBox 11">
+            <a:extLst>
+              <a:ext uri="{FF2B5EF4-FFF2-40B4-BE49-F238E27FC236}">
+                <a16:creationId xmlns:a16="http://schemas.microsoft.com/office/drawing/2014/main" id="{8B7CF95E-CC90-43D3-998A-7BAF22847775}"/>
+              </a:ext>
+            </a:extLst>
+          </p:cNvPr>
+          <p:cNvSpPr txBox="1"/>
+          <p:nvPr/>
+        </p:nvSpPr>
+        <p:spPr>
+          <a:xfrm>
+            <a:off x="6833561" y="2953536"/>
+            <a:ext cx="4046220" cy="400110"/>
+          </a:xfrm>
+          <a:prstGeom prst="rect">
+            <a:avLst/>
+          </a:prstGeom>
+          <a:noFill/>
+        </p:spPr>
+        <p:txBody>
+          <a:bodyPr wrap="square">
+            <a:spAutoFit/>
+          </a:bodyPr>
+          <a:lstStyle/>
+          <a:p>
+            <a:pPr algn="ctr"/>
+            <a:r>
+              <a:rPr lang="en-US" sz="1000" b="0" i="0" u="none" strike="noStrike" dirty="0">
+                <a:solidFill>
+                  <a:srgbClr val="000000"/>
+                </a:solidFill>
+                <a:effectLst/>
+                <a:latin typeface="Courier New" panose="02070309020205020404" pitchFamily="49" charset="0"/>
+              </a:rPr>
+              <a:t>The correlation coefficient between Generosity and Score is 0.14</a:t>
+            </a:r>
+            <a:endParaRPr lang="en-US" sz="1000" dirty="0"/>
+          </a:p>
+        </p:txBody>
+      </p:sp>
+      <p:sp>
+        <p:nvSpPr>
+          <p:cNvPr id="15" name="TextBox 14">
+            <a:extLst>
+              <a:ext uri="{FF2B5EF4-FFF2-40B4-BE49-F238E27FC236}">
+                <a16:creationId xmlns:a16="http://schemas.microsoft.com/office/drawing/2014/main" id="{2B33CC99-1617-40CC-8922-8BED128D73DA}"/>
+              </a:ext>
+            </a:extLst>
+          </p:cNvPr>
+          <p:cNvSpPr txBox="1"/>
+          <p:nvPr/>
+        </p:nvSpPr>
+        <p:spPr>
+          <a:xfrm>
+            <a:off x="1001268" y="5836776"/>
+            <a:ext cx="4814316" cy="400110"/>
+          </a:xfrm>
+          <a:prstGeom prst="rect">
+            <a:avLst/>
+          </a:prstGeom>
+          <a:noFill/>
+        </p:spPr>
+        <p:txBody>
+          <a:bodyPr wrap="square">
+            <a:spAutoFit/>
+          </a:bodyPr>
+          <a:lstStyle/>
+          <a:p>
+            <a:pPr algn="ctr"/>
+            <a:r>
+              <a:rPr lang="en-US" sz="1000" b="0" i="0" u="none" strike="noStrike" dirty="0">
+                <a:solidFill>
+                  <a:srgbClr val="000000"/>
+                </a:solidFill>
+                <a:effectLst/>
+                <a:latin typeface="Courier New" panose="02070309020205020404" pitchFamily="49" charset="0"/>
+              </a:rPr>
+              <a:t>The correlation coefficient between Perceptions of corruption and Score is 0.42</a:t>
+            </a:r>
+            <a:endParaRPr lang="en-US" sz="1000" dirty="0"/>
+          </a:p>
+        </p:txBody>
+      </p:sp>
     </p:spTree>
     <p:extLst>
       <p:ext uri="{BB962C8B-B14F-4D97-AF65-F5344CB8AC3E}">

</xml_diff>